<commit_message>
avances descripcion de intenciones más simples (greetings, goodbyes, capbilities, etc.)
</commit_message>
<xml_diff>
--- a/memoria/images/diagrama intenciones.pptx
+++ b/memoria/images/diagrama intenciones.pptx
@@ -260,7 +260,7 @@
           <a:p>
             <a:fld id="{9C28449B-7E7F-4B22-B31C-7455ACE0523B}" type="datetimeFigureOut">
               <a:rPr lang="es-ES" smtClean="0"/>
-              <a:t>19/01/2018</a:t>
+              <a:t>20/01/2018</a:t>
             </a:fld>
             <a:endParaRPr lang="es-ES"/>
           </a:p>
@@ -430,7 +430,7 @@
           <a:p>
             <a:fld id="{9C28449B-7E7F-4B22-B31C-7455ACE0523B}" type="datetimeFigureOut">
               <a:rPr lang="es-ES" smtClean="0"/>
-              <a:t>19/01/2018</a:t>
+              <a:t>20/01/2018</a:t>
             </a:fld>
             <a:endParaRPr lang="es-ES"/>
           </a:p>
@@ -610,7 +610,7 @@
           <a:p>
             <a:fld id="{9C28449B-7E7F-4B22-B31C-7455ACE0523B}" type="datetimeFigureOut">
               <a:rPr lang="es-ES" smtClean="0"/>
-              <a:t>19/01/2018</a:t>
+              <a:t>20/01/2018</a:t>
             </a:fld>
             <a:endParaRPr lang="es-ES"/>
           </a:p>
@@ -780,7 +780,7 @@
           <a:p>
             <a:fld id="{9C28449B-7E7F-4B22-B31C-7455ACE0523B}" type="datetimeFigureOut">
               <a:rPr lang="es-ES" smtClean="0"/>
-              <a:t>19/01/2018</a:t>
+              <a:t>20/01/2018</a:t>
             </a:fld>
             <a:endParaRPr lang="es-ES"/>
           </a:p>
@@ -1026,7 +1026,7 @@
           <a:p>
             <a:fld id="{9C28449B-7E7F-4B22-B31C-7455ACE0523B}" type="datetimeFigureOut">
               <a:rPr lang="es-ES" smtClean="0"/>
-              <a:t>19/01/2018</a:t>
+              <a:t>20/01/2018</a:t>
             </a:fld>
             <a:endParaRPr lang="es-ES"/>
           </a:p>
@@ -1258,7 +1258,7 @@
           <a:p>
             <a:fld id="{9C28449B-7E7F-4B22-B31C-7455ACE0523B}" type="datetimeFigureOut">
               <a:rPr lang="es-ES" smtClean="0"/>
-              <a:t>19/01/2018</a:t>
+              <a:t>20/01/2018</a:t>
             </a:fld>
             <a:endParaRPr lang="es-ES"/>
           </a:p>
@@ -1625,7 +1625,7 @@
           <a:p>
             <a:fld id="{9C28449B-7E7F-4B22-B31C-7455ACE0523B}" type="datetimeFigureOut">
               <a:rPr lang="es-ES" smtClean="0"/>
-              <a:t>19/01/2018</a:t>
+              <a:t>20/01/2018</a:t>
             </a:fld>
             <a:endParaRPr lang="es-ES"/>
           </a:p>
@@ -1743,7 +1743,7 @@
           <a:p>
             <a:fld id="{9C28449B-7E7F-4B22-B31C-7455ACE0523B}" type="datetimeFigureOut">
               <a:rPr lang="es-ES" smtClean="0"/>
-              <a:t>19/01/2018</a:t>
+              <a:t>20/01/2018</a:t>
             </a:fld>
             <a:endParaRPr lang="es-ES"/>
           </a:p>
@@ -1838,7 +1838,7 @@
           <a:p>
             <a:fld id="{9C28449B-7E7F-4B22-B31C-7455ACE0523B}" type="datetimeFigureOut">
               <a:rPr lang="es-ES" smtClean="0"/>
-              <a:t>19/01/2018</a:t>
+              <a:t>20/01/2018</a:t>
             </a:fld>
             <a:endParaRPr lang="es-ES"/>
           </a:p>
@@ -2115,7 +2115,7 @@
           <a:p>
             <a:fld id="{9C28449B-7E7F-4B22-B31C-7455ACE0523B}" type="datetimeFigureOut">
               <a:rPr lang="es-ES" smtClean="0"/>
-              <a:t>19/01/2018</a:t>
+              <a:t>20/01/2018</a:t>
             </a:fld>
             <a:endParaRPr lang="es-ES"/>
           </a:p>
@@ -2368,7 +2368,7 @@
           <a:p>
             <a:fld id="{9C28449B-7E7F-4B22-B31C-7455ACE0523B}" type="datetimeFigureOut">
               <a:rPr lang="es-ES" smtClean="0"/>
-              <a:t>19/01/2018</a:t>
+              <a:t>20/01/2018</a:t>
             </a:fld>
             <a:endParaRPr lang="es-ES"/>
           </a:p>
@@ -2581,7 +2581,7 @@
           <a:p>
             <a:fld id="{9C28449B-7E7F-4B22-B31C-7455ACE0523B}" type="datetimeFigureOut">
               <a:rPr lang="es-ES" smtClean="0"/>
-              <a:t>19/01/2018</a:t>
+              <a:t>20/01/2018</a:t>
             </a:fld>
             <a:endParaRPr lang="es-ES"/>
           </a:p>
@@ -18629,8 +18629,8 @@
             </p:nvCxnSpPr>
             <p:spPr>
               <a:xfrm flipV="1">
-                <a:off x="-1518982" y="-1223488"/>
-                <a:ext cx="23823" cy="13079103"/>
+                <a:off x="-1519489" y="-1223485"/>
+                <a:ext cx="24330" cy="13758879"/>
               </a:xfrm>
               <a:prstGeom prst="straightConnector1">
                 <a:avLst/>
@@ -18702,9 +18702,9 @@
               <p:nvPr/>
             </p:nvCxnSpPr>
             <p:spPr>
-              <a:xfrm flipH="1">
-                <a:off x="-1518982" y="11844057"/>
-                <a:ext cx="877475" cy="11558"/>
+              <a:xfrm flipH="1" flipV="1">
+                <a:off x="-1604021" y="12602109"/>
+                <a:ext cx="965381" cy="1"/>
               </a:xfrm>
               <a:prstGeom prst="straightConnector1">
                 <a:avLst/>
@@ -19116,8 +19116,8 @@
             </p:nvCxnSpPr>
             <p:spPr>
               <a:xfrm flipH="1">
-                <a:off x="439201" y="10713274"/>
-                <a:ext cx="14697" cy="568536"/>
+                <a:off x="442068" y="10713274"/>
+                <a:ext cx="11830" cy="1326589"/>
               </a:xfrm>
               <a:prstGeom prst="straightConnector1">
                 <a:avLst/>
@@ -21461,7 +21461,7 @@
             </p:nvSpPr>
             <p:spPr>
               <a:xfrm>
-                <a:off x="-641507" y="11281810"/>
+                <a:off x="-638640" y="12039863"/>
                 <a:ext cx="2161416" cy="1124493"/>
               </a:xfrm>
               <a:prstGeom prst="wedgeRoundRectCallout">
@@ -24945,7 +24945,7 @@
             </p:nvSpPr>
             <p:spPr>
               <a:xfrm>
-                <a:off x="-1851200" y="11932083"/>
+                <a:off x="-1919780" y="12688902"/>
                 <a:ext cx="1254702" cy="369332"/>
               </a:xfrm>
               <a:prstGeom prst="rect">

</xml_diff>